<commit_message>
More on mitochondria/cancer in Chapter 4, a tidied up figures
</commit_message>
<xml_diff>
--- a/mito stats figure/mito stats.pptx
+++ b/mito stats figure/mito stats.pptx
@@ -219,16 +219,16 @@
               <c:strCache>
                 <c:ptCount val="4"/>
                 <c:pt idx="0">
-                  <c:v>Untreated, 30m</c:v>
+                  <c:v>30m, no treatment</c:v>
                 </c:pt>
                 <c:pt idx="1">
-                  <c:v>MOF+TPP, 30m</c:v>
+                  <c:v>8h, DCA@UiO-66</c:v>
                 </c:pt>
                 <c:pt idx="2">
-                  <c:v>MOF, 8h</c:v>
+                  <c:v>30m, DCA+TPP@UiO-66</c:v>
                 </c:pt>
                 <c:pt idx="3">
-                  <c:v>MOF+TPP, 8h</c:v>
+                  <c:v>8h, DCA+TPP@UiO-66</c:v>
                 </c:pt>
               </c:strCache>
             </c:strRef>
@@ -243,10 +243,10 @@
                   <c:v>0.81850000000000001</c:v>
                 </c:pt>
                 <c:pt idx="1">
-                  <c:v>0.78549999999999998</c:v>
+                  <c:v>0.79349999999999998</c:v>
                 </c:pt>
                 <c:pt idx="2">
-                  <c:v>0.79349999999999998</c:v>
+                  <c:v>0.78549999999999998</c:v>
                 </c:pt>
                 <c:pt idx="3">
                   <c:v>0.76790000000000003</c:v>
@@ -298,7 +298,7 @@
           <a:lstStyle/>
           <a:p>
             <a:pPr>
-              <a:defRPr sz="2400" b="0" i="0" u="none" strike="noStrike" kern="1200" baseline="0">
+              <a:defRPr sz="2000" b="0" i="0" u="none" strike="noStrike" kern="1200" baseline="0">
                 <a:solidFill>
                   <a:schemeClr val="tx1"/>
                 </a:solidFill>
@@ -1162,7 +1162,7 @@
           <a:p>
             <a:fld id="{9B31DE86-7FAB-4085-911A-DC96899DB059}" type="datetimeFigureOut">
               <a:rPr lang="en-GB" smtClean="0"/>
-              <a:t>14/10/2018</a:t>
+              <a:t>17/10/2018</a:t>
             </a:fld>
             <a:endParaRPr lang="en-GB"/>
           </a:p>
@@ -1362,7 +1362,7 @@
           <a:p>
             <a:fld id="{9B31DE86-7FAB-4085-911A-DC96899DB059}" type="datetimeFigureOut">
               <a:rPr lang="en-GB" smtClean="0"/>
-              <a:t>14/10/2018</a:t>
+              <a:t>17/10/2018</a:t>
             </a:fld>
             <a:endParaRPr lang="en-GB"/>
           </a:p>
@@ -1572,7 +1572,7 @@
           <a:p>
             <a:fld id="{9B31DE86-7FAB-4085-911A-DC96899DB059}" type="datetimeFigureOut">
               <a:rPr lang="en-GB" smtClean="0"/>
-              <a:t>14/10/2018</a:t>
+              <a:t>17/10/2018</a:t>
             </a:fld>
             <a:endParaRPr lang="en-GB"/>
           </a:p>
@@ -1772,7 +1772,7 @@
           <a:p>
             <a:fld id="{9B31DE86-7FAB-4085-911A-DC96899DB059}" type="datetimeFigureOut">
               <a:rPr lang="en-GB" smtClean="0"/>
-              <a:t>14/10/2018</a:t>
+              <a:t>17/10/2018</a:t>
             </a:fld>
             <a:endParaRPr lang="en-GB"/>
           </a:p>
@@ -2048,7 +2048,7 @@
           <a:p>
             <a:fld id="{9B31DE86-7FAB-4085-911A-DC96899DB059}" type="datetimeFigureOut">
               <a:rPr lang="en-GB" smtClean="0"/>
-              <a:t>14/10/2018</a:t>
+              <a:t>17/10/2018</a:t>
             </a:fld>
             <a:endParaRPr lang="en-GB"/>
           </a:p>
@@ -2316,7 +2316,7 @@
           <a:p>
             <a:fld id="{9B31DE86-7FAB-4085-911A-DC96899DB059}" type="datetimeFigureOut">
               <a:rPr lang="en-GB" smtClean="0"/>
-              <a:t>14/10/2018</a:t>
+              <a:t>17/10/2018</a:t>
             </a:fld>
             <a:endParaRPr lang="en-GB"/>
           </a:p>
@@ -2731,7 +2731,7 @@
           <a:p>
             <a:fld id="{9B31DE86-7FAB-4085-911A-DC96899DB059}" type="datetimeFigureOut">
               <a:rPr lang="en-GB" smtClean="0"/>
-              <a:t>14/10/2018</a:t>
+              <a:t>17/10/2018</a:t>
             </a:fld>
             <a:endParaRPr lang="en-GB"/>
           </a:p>
@@ -2873,7 +2873,7 @@
           <a:p>
             <a:fld id="{9B31DE86-7FAB-4085-911A-DC96899DB059}" type="datetimeFigureOut">
               <a:rPr lang="en-GB" smtClean="0"/>
-              <a:t>14/10/2018</a:t>
+              <a:t>17/10/2018</a:t>
             </a:fld>
             <a:endParaRPr lang="en-GB"/>
           </a:p>
@@ -2986,7 +2986,7 @@
           <a:p>
             <a:fld id="{9B31DE86-7FAB-4085-911A-DC96899DB059}" type="datetimeFigureOut">
               <a:rPr lang="en-GB" smtClean="0"/>
-              <a:t>14/10/2018</a:t>
+              <a:t>17/10/2018</a:t>
             </a:fld>
             <a:endParaRPr lang="en-GB"/>
           </a:p>
@@ -3299,7 +3299,7 @@
           <a:p>
             <a:fld id="{9B31DE86-7FAB-4085-911A-DC96899DB059}" type="datetimeFigureOut">
               <a:rPr lang="en-GB" smtClean="0"/>
-              <a:t>14/10/2018</a:t>
+              <a:t>17/10/2018</a:t>
             </a:fld>
             <a:endParaRPr lang="en-GB"/>
           </a:p>
@@ -3588,7 +3588,7 @@
           <a:p>
             <a:fld id="{9B31DE86-7FAB-4085-911A-DC96899DB059}" type="datetimeFigureOut">
               <a:rPr lang="en-GB" smtClean="0"/>
-              <a:t>14/10/2018</a:t>
+              <a:t>17/10/2018</a:t>
             </a:fld>
             <a:endParaRPr lang="en-GB"/>
           </a:p>
@@ -3831,7 +3831,7 @@
           <a:p>
             <a:fld id="{9B31DE86-7FAB-4085-911A-DC96899DB059}" type="datetimeFigureOut">
               <a:rPr lang="en-GB" smtClean="0"/>
-              <a:t>14/10/2018</a:t>
+              <a:t>17/10/2018</a:t>
             </a:fld>
             <a:endParaRPr lang="en-GB"/>
           </a:p>
@@ -4263,7 +4263,7 @@
           <p:nvPr>
             <p:extLst>
               <p:ext uri="{D42A27DB-BD31-4B8C-83A1-F6EECF244321}">
-                <p14:modId xmlns:p14="http://schemas.microsoft.com/office/powerpoint/2010/main" val="1349261804"/>
+                <p14:modId xmlns:p14="http://schemas.microsoft.com/office/powerpoint/2010/main" val="950440462"/>
               </p:ext>
             </p:extLst>
           </p:nvPr>
@@ -4328,7 +4328,7 @@
         </p:nvSpPr>
         <p:spPr>
           <a:xfrm>
-            <a:off x="5252622" y="628650"/>
+            <a:off x="7900388" y="628650"/>
             <a:ext cx="338554" cy="461665"/>
           </a:xfrm>
           <a:prstGeom prst="rect">
@@ -4399,7 +4399,7 @@
         </p:nvSpPr>
         <p:spPr>
           <a:xfrm>
-            <a:off x="7787899" y="533400"/>
+            <a:off x="5115179" y="533400"/>
             <a:ext cx="620683" cy="461665"/>
           </a:xfrm>
           <a:prstGeom prst="rect">
@@ -4439,7 +4439,7 @@
         </p:nvSpPr>
         <p:spPr>
           <a:xfrm>
-            <a:off x="7228130" y="5572125"/>
+            <a:off x="4513505" y="5572125"/>
             <a:ext cx="1740220" cy="461665"/>
           </a:xfrm>
           <a:prstGeom prst="rect">
@@ -4475,7 +4475,7 @@
         </p:nvSpPr>
         <p:spPr>
           <a:xfrm>
-            <a:off x="10423024" y="5657850"/>
+            <a:off x="10423024" y="5667375"/>
             <a:ext cx="646331" cy="461665"/>
           </a:xfrm>
           <a:prstGeom prst="rect">
@@ -4493,6 +4493,46 @@
             <a:r>
               <a:rPr lang="en-GB" sz="2400" dirty="0"/>
               <a:t>***</a:t>
+            </a:r>
+          </a:p>
+        </p:txBody>
+      </p:sp>
+      <p:sp>
+        <p:nvSpPr>
+          <p:cNvPr id="11" name="TextBox 10">
+            <a:extLst>
+              <a:ext uri="{FF2B5EF4-FFF2-40B4-BE49-F238E27FC236}">
+                <a16:creationId xmlns:a16="http://schemas.microsoft.com/office/drawing/2014/main" id="{92E4BBA8-985D-46DF-97DF-86DF4C8973CA}"/>
+              </a:ext>
+            </a:extLst>
+          </p:cNvPr>
+          <p:cNvSpPr txBox="1"/>
+          <p:nvPr/>
+        </p:nvSpPr>
+        <p:spPr>
+          <a:xfrm>
+            <a:off x="7778373" y="5572125"/>
+            <a:ext cx="620683" cy="461665"/>
+          </a:xfrm>
+          <a:prstGeom prst="rect">
+            <a:avLst/>
+          </a:prstGeom>
+          <a:noFill/>
+        </p:spPr>
+        <p:txBody>
+          <a:bodyPr wrap="none" rtlCol="0">
+            <a:spAutoFit/>
+          </a:bodyPr>
+          <a:lstStyle/>
+          <a:p>
+            <a:pPr algn="ctr"/>
+            <a:r>
+              <a:rPr lang="en-GB" sz="2400" i="1" dirty="0" err="1"/>
+              <a:t>n.s</a:t>
+            </a:r>
+            <a:r>
+              <a:rPr lang="en-GB" sz="2400" i="1" dirty="0"/>
+              <a:t>.</a:t>
             </a:r>
           </a:p>
         </p:txBody>

</xml_diff>